<commit_message>
Added Course Materials - Week 2.
</commit_message>
<xml_diff>
--- a/1. Core Java 8/Day 7/Slides/2. Introducing TDD and JUnit5/introducing-tdd-and-junit5-slides.pptx
+++ b/1. Core Java 8/Day 7/Slides/2. Introducing TDD and JUnit5/introducing-tdd-and-junit5-slides.pptx
@@ -2812,7 +2812,7 @@
       </p:sp>
       <p:graphicFrame>
         <p:nvGraphicFramePr>
-          <p:cNvPr id="5" name="Object 4"/>
+          <p:cNvPr id="3" name="Object 2"/>
           <p:cNvGraphicFramePr/>
           <p:nvPr/>
         </p:nvGraphicFramePr>
@@ -2824,7 +2824,7 @@
           <a:graphicData uri="http://schemas.openxmlformats.org/presentationml/2006/ole">
             <mc:AlternateContent xmlns:mc="http://schemas.openxmlformats.org/markup-compatibility/2006">
               <mc:Choice xmlns:v="urn:schemas-microsoft-com:vml" Requires="v">
-                <p:oleObj spid="_x0000_s6" name="" r:id="rId2" imgW="10582275" imgH="3409950" progId="Paint.Picture">
+                <p:oleObj spid="_x0000_s7" name="" r:id="rId2" imgW="10582275" imgH="3409950" progId="Paint.Picture">
                   <p:embed/>
                 </p:oleObj>
               </mc:Choice>
@@ -2929,28 +2929,28 @@
       </p:sp>
       <p:graphicFrame>
         <p:nvGraphicFramePr>
-          <p:cNvPr id="5" name="Object 4"/>
+          <p:cNvPr id="3" name="Object 2"/>
           <p:cNvGraphicFramePr/>
           <p:nvPr/>
         </p:nvGraphicFramePr>
         <p:xfrm>
-          <a:off x="1434465" y="602615"/>
-          <a:ext cx="9322435" cy="5652770"/>
+          <a:off x="1429385" y="1195705"/>
+          <a:ext cx="9332595" cy="5662295"/>
         </p:xfrm>
         <a:graphic>
           <a:graphicData uri="http://schemas.openxmlformats.org/presentationml/2006/ole">
             <mc:AlternateContent xmlns:mc="http://schemas.openxmlformats.org/markup-compatibility/2006">
               <mc:Choice xmlns:v="urn:schemas-microsoft-com:vml" Requires="v">
-                <p:oleObj spid="_x0000_s6" name="" r:id="rId2" imgW="9315450" imgH="5648325" progId="Paint.Picture">
+                <p:oleObj spid="_x0000_s7" name="" r:id="rId2" imgW="9324975" imgH="5657850" progId="Paint.Picture">
                   <p:embed/>
                 </p:oleObj>
               </mc:Choice>
               <mc:Fallback>
-                <p:oleObj name="" r:id="rId2" imgW="9315450" imgH="5648325" progId="Paint.Picture">
+                <p:oleObj name="" r:id="rId2" imgW="9324975" imgH="5657850" progId="Paint.Picture">
                   <p:embed/>
                   <p:pic>
                     <p:nvPicPr>
-                      <p:cNvPr id="0" name="Picture 5"/>
+                      <p:cNvPr id="0" name="Picture 6"/>
                       <p:cNvPicPr/>
                       <p:nvPr/>
                     </p:nvPicPr>
@@ -2962,8 +2962,8 @@
                     </p:blipFill>
                     <p:spPr>
                       <a:xfrm>
-                        <a:off x="1434465" y="602615"/>
-                        <a:ext cx="9322435" cy="5652770"/>
+                        <a:off x="1429385" y="1195705"/>
+                        <a:ext cx="9332595" cy="5662295"/>
                       </a:xfrm>
                       <a:prstGeom prst="rect">
                         <a:avLst/>
@@ -8185,6 +8185,24 @@
       </p:grpSpPr>
       <p:sp>
         <p:nvSpPr>
+          <p:cNvPr id="3" name="Title 2"/>
+          <p:cNvSpPr>
+            <a:spLocks noGrp="1"/>
+          </p:cNvSpPr>
+          <p:nvPr>
+            <p:ph type="title"/>
+          </p:nvPr>
+        </p:nvSpPr>
+        <p:spPr/>
+        <p:txBody>
+          <a:bodyPr/>
+          <a:p>
+            <a:endParaRPr lang="en-US"/>
+          </a:p>
+        </p:txBody>
+      </p:sp>
+      <p:sp>
+        <p:nvSpPr>
           <p:cNvPr id="2" name="object 2"/>
           <p:cNvSpPr/>
           <p:nvPr/>
@@ -8231,6 +8249,24 @@
           <a:p/>
         </p:txBody>
       </p:sp>
+      <p:sp>
+        <p:nvSpPr>
+          <p:cNvPr id="8" name="Content Placeholder 7"/>
+          <p:cNvSpPr>
+            <a:spLocks noGrp="1"/>
+          </p:cNvSpPr>
+          <p:nvPr>
+            <p:ph sz="half" idx="3"/>
+          </p:nvPr>
+        </p:nvSpPr>
+        <p:spPr/>
+        <p:txBody>
+          <a:bodyPr/>
+          <a:p>
+            <a:endParaRPr lang="en-US"/>
+          </a:p>
+        </p:txBody>
+      </p:sp>
       <p:grpSp>
         <p:nvGrpSpPr>
           <p:cNvPr id="4" name="object 4"/>
@@ -8239,7 +8275,7 @@
         </p:nvGrpSpPr>
         <p:grpSpPr>
           <a:xfrm>
-            <a:off x="2291460" y="2698064"/>
+            <a:off x="2514345" y="761949"/>
             <a:ext cx="7820659" cy="1354455"/>
             <a:chOff x="2291460" y="2698064"/>
             <a:chExt cx="7820659" cy="1354455"/>
@@ -8311,6 +8347,36 @@
           </a:p>
         </p:txBody>
       </p:sp>
+      <p:pic>
+        <p:nvPicPr>
+          <p:cNvPr id="100" name="Content Placeholder 99"/>
+          <p:cNvPicPr>
+            <a:picLocks noChangeAspect="1"/>
+          </p:cNvPicPr>
+          <p:nvPr>
+            <p:ph sz="half" idx="2"/>
+          </p:nvPr>
+        </p:nvPicPr>
+        <p:blipFill>
+          <a:blip r:embed="rId3"/>
+          <a:stretch>
+            <a:fillRect/>
+          </a:stretch>
+        </p:blipFill>
+        <p:spPr>
+          <a:xfrm>
+            <a:off x="3429000" y="3124200"/>
+            <a:ext cx="5303520" cy="3246120"/>
+          </a:xfrm>
+          <a:prstGeom prst="rect">
+            <a:avLst/>
+          </a:prstGeom>
+          <a:noFill/>
+          <a:ln w="9525">
+            <a:noFill/>
+          </a:ln>
+        </p:spPr>
+      </p:pic>
     </p:spTree>
   </p:cSld>
   <p:clrMapOvr>

</xml_diff>